<commit_message>
UPDATE PPT and Template (including sponsors and draw QR)
</commit_message>
<xml_diff>
--- a/PPT/1. MLOps, configure your continuous training pipelines with Deep Learning models.pptx
+++ b/PPT/1. MLOps, configure your continuous training pipelines with Deep Learning models.pptx
@@ -7,20 +7,21 @@
     <p:sldMasterId id="2147484871" r:id="rId6"/>
   </p:sldMasterIdLst>
   <p:notesMasterIdLst>
-    <p:notesMasterId r:id="rId15"/>
+    <p:notesMasterId r:id="rId16"/>
   </p:notesMasterIdLst>
   <p:handoutMasterIdLst>
-    <p:handoutMasterId r:id="rId16"/>
+    <p:handoutMasterId r:id="rId17"/>
   </p:handoutMasterIdLst>
   <p:sldIdLst>
     <p:sldId id="2076136255" r:id="rId7"/>
     <p:sldId id="2076136261" r:id="rId8"/>
-    <p:sldId id="2076136245" r:id="rId9"/>
-    <p:sldId id="2076136257" r:id="rId10"/>
-    <p:sldId id="2076136258" r:id="rId11"/>
-    <p:sldId id="2076136259" r:id="rId12"/>
-    <p:sldId id="2076136260" r:id="rId13"/>
-    <p:sldId id="2076136262" r:id="rId14"/>
+    <p:sldId id="2076136263" r:id="rId9"/>
+    <p:sldId id="2076136245" r:id="rId10"/>
+    <p:sldId id="2076136257" r:id="rId11"/>
+    <p:sldId id="2076136258" r:id="rId12"/>
+    <p:sldId id="2076136259" r:id="rId13"/>
+    <p:sldId id="2076136260" r:id="rId14"/>
+    <p:sldId id="2076136262" r:id="rId15"/>
   </p:sldIdLst>
   <p:sldSz cx="12192000" cy="6858000"/>
   <p:notesSz cx="6858000" cy="1123950"/>
@@ -130,6 +131,7 @@
         <p14:section name="Presentation" id="{111C68EB-42C2-4590-AB8C-55293A14ED12}">
           <p14:sldIdLst>
             <p14:sldId id="2076136261"/>
+            <p14:sldId id="2076136263"/>
             <p14:sldId id="2076136245"/>
           </p14:sldIdLst>
         </p14:section>
@@ -278,7 +280,7 @@
               <a:rPr lang="en-US" smtClean="0">
                 <a:latin typeface="Segoe UI" pitchFamily="34" charset="0"/>
               </a:rPr>
-              <a:t>1/9/2021 9:56 PM</a:t>
+              <a:t>1/10/2021 10:19 AM</a:t>
             </a:fld>
             <a:endParaRPr lang="en-US">
               <a:latin typeface="Segoe UI" pitchFamily="34" charset="0"/>
@@ -556,7 +558,7 @@
           <a:p>
             <a:fld id="{386CE63F-9E7F-4C04-9D0D-FCA25A8E9E86}" type="datetime8">
               <a:rPr lang="en-US" smtClean="0"/>
-              <a:t>1/9/2021 9:56 PM</a:t>
+              <a:t>1/10/2021 10:18 AM</a:t>
             </a:fld>
             <a:endParaRPr lang="en-US"/>
           </a:p>
@@ -1355,7 +1357,7 @@
         </p:nvSpPr>
         <p:spPr bwMode="auto">
           <a:xfrm>
-            <a:off x="0" y="-12702"/>
+            <a:off x="163691" y="-12702"/>
             <a:ext cx="12192000" cy="6858000"/>
           </a:xfrm>
           <a:prstGeom prst="rect">
@@ -1919,36 +1921,6 @@
           </a:p>
         </p:txBody>
       </p:sp>
-      <p:pic>
-        <p:nvPicPr>
-          <p:cNvPr id="10" name="Imagen 9">
-            <a:extLst>
-              <a:ext uri="{FF2B5EF4-FFF2-40B4-BE49-F238E27FC236}">
-                <a16:creationId xmlns:a16="http://schemas.microsoft.com/office/drawing/2014/main" id="{9B3858D6-0FF7-4BC1-95DB-AC45D9BD4823}"/>
-              </a:ext>
-            </a:extLst>
-          </p:cNvPr>
-          <p:cNvPicPr>
-            <a:picLocks noChangeAspect="1"/>
-          </p:cNvPicPr>
-          <p:nvPr userDrawn="1"/>
-        </p:nvPicPr>
-        <p:blipFill>
-          <a:blip r:embed="rId10"/>
-          <a:stretch>
-            <a:fillRect/>
-          </a:stretch>
-        </p:blipFill>
-        <p:spPr>
-          <a:xfrm>
-            <a:off x="8358695" y="1056249"/>
-            <a:ext cx="3265871" cy="3265871"/>
-          </a:xfrm>
-          <a:prstGeom prst="rect">
-            <a:avLst/>
-          </a:prstGeom>
-        </p:spPr>
-      </p:pic>
       <p:graphicFrame>
         <p:nvGraphicFramePr>
           <p:cNvPr id="54" name="Objeto 53">
@@ -1977,12 +1949,12 @@
           <a:graphicData uri="http://schemas.openxmlformats.org/presentationml/2006/ole">
             <mc:AlternateContent xmlns:mc="http://schemas.openxmlformats.org/markup-compatibility/2006">
               <mc:Choice xmlns:v="urn:schemas-microsoft-com:vml" Requires="v">
-                <p:oleObj name="CorelDRAW" r:id="rId11" imgW="1486020" imgH="1396161" progId="CorelDraw.Graphic.21">
+                <p:oleObj name="CorelDRAW" r:id="rId10" imgW="1486020" imgH="1396161" progId="CorelDraw.Graphic.21">
                   <p:embed/>
                 </p:oleObj>
               </mc:Choice>
               <mc:Fallback>
-                <p:oleObj name="CorelDRAW" r:id="rId11" imgW="1486020" imgH="1396161" progId="CorelDraw.Graphic.21">
+                <p:oleObj name="CorelDRAW" r:id="rId10" imgW="1486020" imgH="1396161" progId="CorelDraw.Graphic.21">
                   <p:embed/>
                   <p:pic>
                     <p:nvPicPr>
@@ -1997,7 +1969,7 @@
                       <p:nvPr/>
                     </p:nvPicPr>
                     <p:blipFill>
-                      <a:blip r:embed="rId12"/>
+                      <a:blip r:embed="rId11"/>
                       <a:stretch>
                         <a:fillRect/>
                       </a:stretch>
@@ -2039,19 +2011,19 @@
           </p:nvPr>
         </p:nvGraphicFramePr>
         <p:xfrm>
-          <a:off x="4813301" y="323389"/>
-          <a:ext cx="2807258" cy="564916"/>
+          <a:off x="4813300" y="323850"/>
+          <a:ext cx="2806700" cy="565150"/>
         </p:xfrm>
         <a:graphic>
           <a:graphicData uri="http://schemas.openxmlformats.org/presentationml/2006/ole">
             <mc:AlternateContent xmlns:mc="http://schemas.openxmlformats.org/markup-compatibility/2006">
               <mc:Choice xmlns:v="urn:schemas-microsoft-com:vml" Requires="v">
-                <p:oleObj name="CorelDRAW" r:id="rId13" imgW="3857236" imgH="777027" progId="CorelDraw.Graphic.21">
+                <p:oleObj name="CorelDRAW" r:id="rId12" imgW="3857236" imgH="777027" progId="CorelDraw.Graphic.21">
                   <p:embed/>
                 </p:oleObj>
               </mc:Choice>
               <mc:Fallback>
-                <p:oleObj name="CorelDRAW" r:id="rId13" imgW="3857236" imgH="777027" progId="CorelDraw.Graphic.21">
+                <p:oleObj name="CorelDRAW" r:id="rId12" imgW="3857236" imgH="777027" progId="CorelDraw.Graphic.21">
                   <p:embed/>
                   <p:pic>
                     <p:nvPicPr>
@@ -2060,15 +2032,15 @@
                       <p:nvPr/>
                     </p:nvPicPr>
                     <p:blipFill>
-                      <a:blip r:embed="rId14"/>
+                      <a:blip r:embed="rId13"/>
                       <a:stretch>
                         <a:fillRect/>
                       </a:stretch>
                     </p:blipFill>
                     <p:spPr>
                       <a:xfrm>
-                        <a:off x="4813301" y="323389"/>
-                        <a:ext cx="2807258" cy="564916"/>
+                        <a:off x="4813300" y="323850"/>
+                        <a:ext cx="2806700" cy="565150"/>
                       </a:xfrm>
                       <a:prstGeom prst="rect">
                         <a:avLst/>
@@ -2081,12 +2053,42 @@
           </a:graphicData>
         </a:graphic>
       </p:graphicFrame>
+      <p:pic>
+        <p:nvPicPr>
+          <p:cNvPr id="27" name="Imagen 26">
+            <a:extLst>
+              <a:ext uri="{FF2B5EF4-FFF2-40B4-BE49-F238E27FC236}">
+                <a16:creationId xmlns:a16="http://schemas.microsoft.com/office/drawing/2014/main" id="{803DF735-4E65-4EFC-9618-7D089AF1CF0C}"/>
+              </a:ext>
+            </a:extLst>
+          </p:cNvPr>
+          <p:cNvPicPr>
+            <a:picLocks noChangeAspect="1"/>
+          </p:cNvPicPr>
+          <p:nvPr userDrawn="1"/>
+        </p:nvPicPr>
+        <p:blipFill>
+          <a:blip r:embed="rId14"/>
+          <a:stretch>
+            <a:fillRect/>
+          </a:stretch>
+        </p:blipFill>
+        <p:spPr>
+          <a:xfrm>
+            <a:off x="8411164" y="5047695"/>
+            <a:ext cx="1839530" cy="567666"/>
+          </a:xfrm>
+          <a:prstGeom prst="rect">
+            <a:avLst/>
+          </a:prstGeom>
+        </p:spPr>
+      </p:pic>
       <p:sp>
         <p:nvSpPr>
-          <p:cNvPr id="56" name="Title 1">
+          <p:cNvPr id="32" name="Title 1">
             <a:extLst>
               <a:ext uri="{FF2B5EF4-FFF2-40B4-BE49-F238E27FC236}">
-                <a16:creationId xmlns:a16="http://schemas.microsoft.com/office/drawing/2014/main" id="{8761AF01-7317-4FAE-9A1B-666EB08D523C}"/>
+                <a16:creationId xmlns:a16="http://schemas.microsoft.com/office/drawing/2014/main" id="{55C23879-3E01-4897-A22B-7F0B72BE2AB6}"/>
               </a:ext>
             </a:extLst>
           </p:cNvPr>
@@ -2097,8 +2099,119 @@
         </p:nvSpPr>
         <p:spPr>
           <a:xfrm>
-            <a:off x="8399659" y="458678"/>
-            <a:ext cx="3139223" cy="369332"/>
+            <a:off x="5265547" y="3808515"/>
+            <a:ext cx="2401780" cy="553998"/>
+          </a:xfrm>
+          <a:prstGeom prst="rect">
+            <a:avLst/>
+          </a:prstGeom>
+          <a:noFill/>
+        </p:spPr>
+        <p:txBody>
+          <a:bodyPr vert="horz" wrap="square" lIns="0" tIns="0" rIns="0" bIns="0" rtlCol="0" anchor="b" anchorCtr="0">
+            <a:spAutoFit/>
+          </a:bodyPr>
+          <a:lstStyle>
+            <a:lvl1pPr algn="l" defTabSz="932742" rtl="0" eaLnBrk="1" latinLnBrk="0" hangingPunct="1">
+              <a:lnSpc>
+                <a:spcPct val="100000"/>
+              </a:lnSpc>
+              <a:spcBef>
+                <a:spcPct val="0"/>
+              </a:spcBef>
+              <a:buNone/>
+              <a:defRPr lang="en-US" sz="2800" b="1" kern="1200" cap="none" spc="-50" baseline="0">
+                <a:ln w="3175">
+                  <a:noFill/>
+                </a:ln>
+                <a:solidFill>
+                  <a:srgbClr val="D6532B"/>
+                </a:solidFill>
+                <a:effectLst/>
+                <a:latin typeface="Quicksand" pitchFamily="2" charset="0"/>
+                <a:ea typeface="+mn-ea"/>
+                <a:cs typeface="Segoe UI" panose="020B0502040204020203" pitchFamily="34" charset="0"/>
+              </a:defRPr>
+            </a:lvl1pPr>
+          </a:lstStyle>
+          <a:p>
+            <a:pPr algn="ctr"/>
+            <a:r>
+              <a:rPr lang="es-ES" sz="1800" b="1" dirty="0">
+                <a:solidFill>
+                  <a:srgbClr val="D6532B"/>
+                </a:solidFill>
+              </a:rPr>
+              <a:t>escanea y participa </a:t>
+            </a:r>
+          </a:p>
+          <a:p>
+            <a:pPr algn="ctr"/>
+            <a:r>
+              <a:rPr lang="es-ES" sz="1800" b="1" dirty="0">
+                <a:solidFill>
+                  <a:srgbClr val="D6532B"/>
+                </a:solidFill>
+              </a:rPr>
+              <a:t>en el sorteo 👉</a:t>
+            </a:r>
+          </a:p>
+        </p:txBody>
+      </p:sp>
+      <p:pic>
+        <p:nvPicPr>
+          <p:cNvPr id="34" name="Gráfico 33">
+            <a:extLst>
+              <a:ext uri="{FF2B5EF4-FFF2-40B4-BE49-F238E27FC236}">
+                <a16:creationId xmlns:a16="http://schemas.microsoft.com/office/drawing/2014/main" id="{46CD2E65-DF1B-41B2-8D5A-552843F7E5C9}"/>
+              </a:ext>
+            </a:extLst>
+          </p:cNvPr>
+          <p:cNvPicPr>
+            <a:picLocks noChangeAspect="1"/>
+          </p:cNvPicPr>
+          <p:nvPr userDrawn="1"/>
+        </p:nvPicPr>
+        <p:blipFill>
+          <a:blip r:embed="rId15">
+            <a:extLst>
+              <a:ext uri="{96DAC541-7B7A-43D3-8B79-37D633B846F1}">
+                <asvg:svgBlip xmlns:asvg="http://schemas.microsoft.com/office/drawing/2016/SVG/main" r:embed="rId16"/>
+              </a:ext>
+            </a:extLst>
+          </a:blip>
+          <a:stretch>
+            <a:fillRect/>
+          </a:stretch>
+        </p:blipFill>
+        <p:spPr>
+          <a:xfrm>
+            <a:off x="8302458" y="1133989"/>
+            <a:ext cx="3486412" cy="3486412"/>
+          </a:xfrm>
+          <a:prstGeom prst="rect">
+            <a:avLst/>
+          </a:prstGeom>
+        </p:spPr>
+      </p:pic>
+      <p:sp>
+        <p:nvSpPr>
+          <p:cNvPr id="35" name="Title 1">
+            <a:extLst>
+              <a:ext uri="{FF2B5EF4-FFF2-40B4-BE49-F238E27FC236}">
+                <a16:creationId xmlns:a16="http://schemas.microsoft.com/office/drawing/2014/main" id="{47DF5C06-FFCC-4A20-885B-FC62EB46E737}"/>
+              </a:ext>
+            </a:extLst>
+          </p:cNvPr>
+          <p:cNvSpPr txBox="1">
+            <a:spLocks/>
+          </p:cNvSpPr>
+          <p:nvPr userDrawn="1"/>
+        </p:nvSpPr>
+        <p:spPr>
+          <a:xfrm>
+            <a:off x="8394230" y="472034"/>
+            <a:ext cx="3284341" cy="369332"/>
           </a:xfrm>
           <a:prstGeom prst="rect">
             <a:avLst/>
@@ -2140,17 +2253,17 @@
                   <a:srgbClr val="D6532B"/>
                 </a:solidFill>
               </a:rPr>
-              <a:t>Ayúdanos a mejorar!</a:t>
+              <a:t>#SORTEOCUPON50 🎁</a:t>
             </a:r>
           </a:p>
         </p:txBody>
       </p:sp>
       <p:pic>
         <p:nvPicPr>
-          <p:cNvPr id="27" name="Imagen 26">
+          <p:cNvPr id="38" name="Gráfico 37">
             <a:extLst>
               <a:ext uri="{FF2B5EF4-FFF2-40B4-BE49-F238E27FC236}">
-                <a16:creationId xmlns:a16="http://schemas.microsoft.com/office/drawing/2014/main" id="{803DF735-4E65-4EFC-9618-7D089AF1CF0C}"/>
+                <a16:creationId xmlns:a16="http://schemas.microsoft.com/office/drawing/2014/main" id="{D828FAD7-80FA-448F-8791-57EDDAB90EEE}"/>
               </a:ext>
             </a:extLst>
           </p:cNvPr>
@@ -2160,15 +2273,21 @@
           <p:nvPr userDrawn="1"/>
         </p:nvPicPr>
         <p:blipFill>
-          <a:blip r:embed="rId15"/>
+          <a:blip r:embed="rId17">
+            <a:extLst>
+              <a:ext uri="{96DAC541-7B7A-43D3-8B79-37D633B846F1}">
+                <asvg:svgBlip xmlns:asvg="http://schemas.microsoft.com/office/drawing/2016/SVG/main" r:embed="rId18"/>
+              </a:ext>
+            </a:extLst>
+          </a:blip>
           <a:stretch>
             <a:fillRect/>
           </a:stretch>
         </p:blipFill>
         <p:spPr>
           <a:xfrm>
-            <a:off x="8411164" y="5047695"/>
-            <a:ext cx="1839530" cy="567666"/>
+            <a:off x="5501889" y="2377869"/>
+            <a:ext cx="1851408" cy="1347955"/>
           </a:xfrm>
           <a:prstGeom prst="rect">
             <a:avLst/>
@@ -2229,6 +2348,26 @@
                                         <p:cTn id="6" dur="20000" fill="hold"/>
                                         <p:tgtEl>
                                           <p:spTgt spid="54"/>
+                                        </p:tgtEl>
+                                        <p:attrNameLst>
+                                          <p:attrName>r</p:attrName>
+                                        </p:attrNameLst>
+                                      </p:cBhvr>
+                                    </p:animRot>
+                                  </p:childTnLst>
+                                </p:cTn>
+                              </p:par>
+                              <p:par>
+                                <p:cTn id="7" presetID="8" presetClass="emph" presetSubtype="0" repeatCount="indefinite" accel="33333" decel="33333" fill="hold" nodeType="withEffect">
+                                  <p:stCondLst>
+                                    <p:cond delay="0"/>
+                                  </p:stCondLst>
+                                  <p:childTnLst>
+                                    <p:animRot by="21600000">
+                                      <p:cBhvr>
+                                        <p:cTn id="8" dur="3000" fill="hold"/>
+                                        <p:tgtEl>
+                                          <p:spTgt spid="38"/>
                                         </p:tgtEl>
                                         <p:attrNameLst>
                                           <p:attrName>r</p:attrName>
@@ -25126,7 +25265,7 @@
         </p:nvSpPr>
         <p:spPr bwMode="auto">
           <a:xfrm>
-            <a:off x="-11164" y="-83506"/>
+            <a:off x="90436" y="-83506"/>
             <a:ext cx="12192000" cy="6858000"/>
           </a:xfrm>
           <a:prstGeom prst="rect">
@@ -42838,8 +42977,8 @@
         </p:nvSpPr>
         <p:spPr>
           <a:xfrm>
-            <a:off x="584200" y="1259729"/>
-            <a:ext cx="5510213" cy="2215991"/>
+            <a:off x="584200" y="2921722"/>
+            <a:ext cx="5510213" cy="553998"/>
           </a:xfrm>
         </p:spPr>
         <p:txBody>
@@ -42847,12 +42986,8 @@
           <a:lstStyle/>
           <a:p>
             <a:r>
-              <a:rPr lang="en-US" dirty="0" err="1"/>
-              <a:t>MLOps</a:t>
-            </a:r>
-            <a:r>
               <a:rPr lang="en-US" dirty="0"/>
-              <a:t>, configure your continuous training pipelines with Deep Learning models</a:t>
+              <a:t>#SorteoCUPON50</a:t>
             </a:r>
             <a:endParaRPr lang="es-ES" dirty="0"/>
           </a:p>
@@ -42914,7 +43049,7 @@
           <a:p>
             <a:r>
               <a:rPr lang="es-ES" dirty="0"/>
-              <a:t>Madrid - </a:t>
+              <a:t>Madrid – </a:t>
             </a:r>
             <a:r>
               <a:rPr lang="es-ES" dirty="0" err="1"/>
@@ -43069,6 +43204,261 @@
           <a:chExt cx="0" cy="0"/>
         </a:xfrm>
       </p:grpSpPr>
+      <p:sp>
+        <p:nvSpPr>
+          <p:cNvPr id="6" name="Título 5">
+            <a:extLst>
+              <a:ext uri="{FF2B5EF4-FFF2-40B4-BE49-F238E27FC236}">
+                <a16:creationId xmlns:a16="http://schemas.microsoft.com/office/drawing/2014/main" id="{155300A5-3509-42AD-8CEF-6590A562B1E5}"/>
+              </a:ext>
+            </a:extLst>
+          </p:cNvPr>
+          <p:cNvSpPr>
+            <a:spLocks noGrp="1"/>
+          </p:cNvSpPr>
+          <p:nvPr>
+            <p:ph type="title"/>
+          </p:nvPr>
+        </p:nvSpPr>
+        <p:spPr>
+          <a:xfrm>
+            <a:off x="584200" y="1259729"/>
+            <a:ext cx="5510213" cy="2215991"/>
+          </a:xfrm>
+        </p:spPr>
+        <p:txBody>
+          <a:bodyPr/>
+          <a:lstStyle/>
+          <a:p>
+            <a:r>
+              <a:rPr lang="en-US" dirty="0" err="1"/>
+              <a:t>MLOps</a:t>
+            </a:r>
+            <a:r>
+              <a:rPr lang="en-US" dirty="0"/>
+              <a:t>, configure your continuous training pipelines with Deep Learning models</a:t>
+            </a:r>
+            <a:endParaRPr lang="es-ES" dirty="0"/>
+          </a:p>
+        </p:txBody>
+      </p:sp>
+      <p:sp>
+        <p:nvSpPr>
+          <p:cNvPr id="7" name="Marcador de texto 6">
+            <a:extLst>
+              <a:ext uri="{FF2B5EF4-FFF2-40B4-BE49-F238E27FC236}">
+                <a16:creationId xmlns:a16="http://schemas.microsoft.com/office/drawing/2014/main" id="{69511D55-34D4-45A0-8602-117128967C6C}"/>
+              </a:ext>
+            </a:extLst>
+          </p:cNvPr>
+          <p:cNvSpPr>
+            <a:spLocks noGrp="1"/>
+          </p:cNvSpPr>
+          <p:nvPr>
+            <p:ph type="body" sz="quarter" idx="12"/>
+          </p:nvPr>
+        </p:nvSpPr>
+        <p:spPr/>
+        <p:txBody>
+          <a:bodyPr/>
+          <a:lstStyle/>
+          <a:p>
+            <a:r>
+              <a:rPr lang="es-ES" dirty="0"/>
+              <a:t>Alejandro Almeida</a:t>
+            </a:r>
+          </a:p>
+        </p:txBody>
+      </p:sp>
+      <p:sp>
+        <p:nvSpPr>
+          <p:cNvPr id="8" name="Marcador de texto 7">
+            <a:extLst>
+              <a:ext uri="{FF2B5EF4-FFF2-40B4-BE49-F238E27FC236}">
+                <a16:creationId xmlns:a16="http://schemas.microsoft.com/office/drawing/2014/main" id="{57BDD8B0-0FB5-474B-A56B-FB1AAA4961CA}"/>
+              </a:ext>
+            </a:extLst>
+          </p:cNvPr>
+          <p:cNvSpPr>
+            <a:spLocks noGrp="1"/>
+          </p:cNvSpPr>
+          <p:nvPr>
+            <p:ph type="body" sz="quarter" idx="13"/>
+          </p:nvPr>
+        </p:nvSpPr>
+        <p:spPr>
+          <a:xfrm>
+            <a:off x="6597944" y="2320226"/>
+            <a:ext cx="4714906" cy="1083374"/>
+          </a:xfrm>
+        </p:spPr>
+        <p:txBody>
+          <a:bodyPr/>
+          <a:lstStyle/>
+          <a:p>
+            <a:r>
+              <a:rPr lang="es-ES" dirty="0"/>
+              <a:t>Madrid – </a:t>
+            </a:r>
+            <a:r>
+              <a:rPr lang="es-ES" dirty="0" err="1"/>
+              <a:t>Spain</a:t>
+            </a:r>
+            <a:endParaRPr lang="es-ES" dirty="0"/>
+          </a:p>
+          <a:p>
+            <a:r>
+              <a:rPr lang="es-ES" dirty="0"/>
+              <a:t>16 Enero 2021</a:t>
+            </a:r>
+          </a:p>
+        </p:txBody>
+      </p:sp>
+      <p:sp>
+        <p:nvSpPr>
+          <p:cNvPr id="9" name="Marcador de texto 8">
+            <a:extLst>
+              <a:ext uri="{FF2B5EF4-FFF2-40B4-BE49-F238E27FC236}">
+                <a16:creationId xmlns:a16="http://schemas.microsoft.com/office/drawing/2014/main" id="{45C40D03-0ACA-4055-8A76-253AAF2DB6F5}"/>
+              </a:ext>
+            </a:extLst>
+          </p:cNvPr>
+          <p:cNvSpPr>
+            <a:spLocks noGrp="1"/>
+          </p:cNvSpPr>
+          <p:nvPr>
+            <p:ph type="body" sz="quarter" idx="15"/>
+          </p:nvPr>
+        </p:nvSpPr>
+        <p:spPr/>
+        <p:txBody>
+          <a:bodyPr/>
+          <a:lstStyle/>
+          <a:p>
+            <a:r>
+              <a:rPr lang="es-ES" b="0" i="0" dirty="0">
+                <a:solidFill>
+                  <a:srgbClr val="676A6C"/>
+                </a:solidFill>
+                <a:effectLst/>
+                <a:latin typeface="open sans" panose="020B0606030504020204" pitchFamily="34" charset="0"/>
+              </a:rPr>
+              <a:t>Microsoft Azure MVP | Azure Lead at Prodware</a:t>
+            </a:r>
+            <a:endParaRPr lang="es-ES" dirty="0"/>
+          </a:p>
+        </p:txBody>
+      </p:sp>
+      <p:sp>
+        <p:nvSpPr>
+          <p:cNvPr id="10" name="Marcador de texto 9">
+            <a:extLst>
+              <a:ext uri="{FF2B5EF4-FFF2-40B4-BE49-F238E27FC236}">
+                <a16:creationId xmlns:a16="http://schemas.microsoft.com/office/drawing/2014/main" id="{51F79510-2274-4494-ADE0-993B6B332068}"/>
+              </a:ext>
+            </a:extLst>
+          </p:cNvPr>
+          <p:cNvSpPr>
+            <a:spLocks noGrp="1"/>
+          </p:cNvSpPr>
+          <p:nvPr>
+            <p:ph type="body" sz="quarter" idx="16"/>
+          </p:nvPr>
+        </p:nvSpPr>
+        <p:spPr/>
+        <p:txBody>
+          <a:bodyPr/>
+          <a:lstStyle/>
+          <a:p>
+            <a:r>
+              <a:rPr lang="es-ES" dirty="0"/>
+              <a:t>Alexander González</a:t>
+            </a:r>
+          </a:p>
+        </p:txBody>
+      </p:sp>
+      <p:sp>
+        <p:nvSpPr>
+          <p:cNvPr id="11" name="Marcador de texto 10">
+            <a:extLst>
+              <a:ext uri="{FF2B5EF4-FFF2-40B4-BE49-F238E27FC236}">
+                <a16:creationId xmlns:a16="http://schemas.microsoft.com/office/drawing/2014/main" id="{05FA5317-BE03-448C-B778-A10EC9464330}"/>
+              </a:ext>
+            </a:extLst>
+          </p:cNvPr>
+          <p:cNvSpPr>
+            <a:spLocks noGrp="1"/>
+          </p:cNvSpPr>
+          <p:nvPr>
+            <p:ph type="body" sz="quarter" idx="17"/>
+          </p:nvPr>
+        </p:nvSpPr>
+        <p:spPr/>
+        <p:txBody>
+          <a:bodyPr/>
+          <a:lstStyle/>
+          <a:p>
+            <a:r>
+              <a:rPr lang="es-ES" dirty="0"/>
+              <a:t>Microsoft AI MVP | </a:t>
+            </a:r>
+            <a:r>
+              <a:rPr lang="es-ES" dirty="0" err="1"/>
+              <a:t>Engineer</a:t>
+            </a:r>
+            <a:r>
+              <a:rPr lang="es-ES" dirty="0"/>
+              <a:t> at </a:t>
+            </a:r>
+            <a:r>
+              <a:rPr lang="es-ES" dirty="0" err="1"/>
+              <a:t>Plain</a:t>
+            </a:r>
+            <a:r>
+              <a:rPr lang="es-ES" dirty="0"/>
+              <a:t> </a:t>
+            </a:r>
+            <a:r>
+              <a:rPr lang="es-ES" dirty="0" err="1"/>
+              <a:t>Concepts</a:t>
+            </a:r>
+            <a:endParaRPr lang="es-ES" dirty="0"/>
+          </a:p>
+        </p:txBody>
+      </p:sp>
+    </p:spTree>
+    <p:extLst>
+      <p:ext uri="{BB962C8B-B14F-4D97-AF65-F5344CB8AC3E}">
+        <p14:creationId xmlns:p14="http://schemas.microsoft.com/office/powerpoint/2010/main" val="2903834351"/>
+      </p:ext>
+    </p:extLst>
+  </p:cSld>
+  <p:clrMapOvr>
+    <a:masterClrMapping/>
+  </p:clrMapOvr>
+  <p:transition spd="med">
+    <p:pull/>
+  </p:transition>
+</p:sld>
+</file>
+
+<file path=ppt/slides/slide4.xml><?xml version="1.0" encoding="utf-8"?>
+<p:sld xmlns:a="http://schemas.openxmlformats.org/drawingml/2006/main" xmlns:r="http://schemas.openxmlformats.org/officeDocument/2006/relationships" xmlns:p="http://schemas.openxmlformats.org/presentationml/2006/main">
+  <p:cSld>
+    <p:spTree>
+      <p:nvGrpSpPr>
+        <p:cNvPr id="1" name=""/>
+        <p:cNvGrpSpPr/>
+        <p:nvPr/>
+      </p:nvGrpSpPr>
+      <p:grpSpPr>
+        <a:xfrm>
+          <a:off x="0" y="0"/>
+          <a:ext cx="0" cy="0"/>
+          <a:chOff x="0" y="0"/>
+          <a:chExt cx="0" cy="0"/>
+        </a:xfrm>
+      </p:grpSpPr>
     </p:spTree>
     <p:extLst>
       <p:ext uri="{BB962C8B-B14F-4D97-AF65-F5344CB8AC3E}">
@@ -43085,7 +43475,7 @@
 </p:sld>
 </file>
 
-<file path=ppt/slides/slide4.xml><?xml version="1.0" encoding="utf-8"?>
+<file path=ppt/slides/slide5.xml><?xml version="1.0" encoding="utf-8"?>
 <p:sld xmlns:a="http://schemas.openxmlformats.org/drawingml/2006/main" xmlns:r="http://schemas.openxmlformats.org/officeDocument/2006/relationships" xmlns:p="http://schemas.openxmlformats.org/presentationml/2006/main">
   <p:cSld>
     <p:spTree>
@@ -43168,7 +43558,7 @@
 </p:sld>
 </file>
 
-<file path=ppt/slides/slide5.xml><?xml version="1.0" encoding="utf-8"?>
+<file path=ppt/slides/slide6.xml><?xml version="1.0" encoding="utf-8"?>
 <p:sld xmlns:a="http://schemas.openxmlformats.org/drawingml/2006/main" xmlns:r="http://schemas.openxmlformats.org/officeDocument/2006/relationships" xmlns:p="http://schemas.openxmlformats.org/presentationml/2006/main">
   <p:cSld>
     <p:spTree>
@@ -43226,7 +43616,7 @@
 </p:sld>
 </file>
 
-<file path=ppt/slides/slide6.xml><?xml version="1.0" encoding="utf-8"?>
+<file path=ppt/slides/slide7.xml><?xml version="1.0" encoding="utf-8"?>
 <p:sld xmlns:a="http://schemas.openxmlformats.org/drawingml/2006/main" xmlns:r="http://schemas.openxmlformats.org/officeDocument/2006/relationships" xmlns:p="http://schemas.openxmlformats.org/presentationml/2006/main">
   <p:cSld>
     <p:spTree>
@@ -43309,7 +43699,7 @@
 </p:sld>
 </file>
 
-<file path=ppt/slides/slide7.xml><?xml version="1.0" encoding="utf-8"?>
+<file path=ppt/slides/slide8.xml><?xml version="1.0" encoding="utf-8"?>
 <p:sld xmlns:a="http://schemas.openxmlformats.org/drawingml/2006/main" xmlns:r="http://schemas.openxmlformats.org/officeDocument/2006/relationships" xmlns:p="http://schemas.openxmlformats.org/presentationml/2006/main">
   <p:cSld>
     <p:spTree>
@@ -43384,7 +43774,7 @@
 </p:sld>
 </file>
 
-<file path=ppt/slides/slide8.xml><?xml version="1.0" encoding="utf-8"?>
+<file path=ppt/slides/slide9.xml><?xml version="1.0" encoding="utf-8"?>
 <p:sld xmlns:a="http://schemas.openxmlformats.org/drawingml/2006/main" xmlns:r="http://schemas.openxmlformats.org/officeDocument/2006/relationships" xmlns:p="http://schemas.openxmlformats.org/presentationml/2006/main">
   <p:cSld>
     <p:spTree>
@@ -43417,12 +43807,25 @@
             <p:ph type="title"/>
           </p:nvPr>
         </p:nvSpPr>
-        <p:spPr/>
+        <p:spPr>
+          <a:xfrm>
+            <a:off x="762991" y="1295467"/>
+            <a:ext cx="4075714" cy="1723549"/>
+          </a:xfrm>
+        </p:spPr>
         <p:txBody>
           <a:bodyPr/>
           <a:lstStyle/>
           <a:p>
-            <a:endParaRPr lang="es-ES"/>
+            <a:r>
+              <a:rPr lang="en-US" dirty="0" err="1"/>
+              <a:t>MLOps</a:t>
+            </a:r>
+            <a:r>
+              <a:rPr lang="en-US" dirty="0"/>
+              <a:t>, configure your continuous training pipelines with Deep Learning models</a:t>
+            </a:r>
+            <a:endParaRPr lang="es-ES" dirty="0"/>
           </a:p>
         </p:txBody>
       </p:sp>
@@ -43442,12 +43845,23 @@
             <p:ph type="body" sz="quarter" idx="12"/>
           </p:nvPr>
         </p:nvSpPr>
-        <p:spPr/>
+        <p:spPr>
+          <a:xfrm>
+            <a:off x="762991" y="3418734"/>
+            <a:ext cx="4075714" cy="492443"/>
+          </a:xfrm>
+        </p:spPr>
         <p:txBody>
           <a:bodyPr/>
           <a:lstStyle/>
           <a:p>
-            <a:endParaRPr lang="es-ES"/>
+            <a:r>
+              <a:rPr lang="es-ES" dirty="0"/>
+              <a:t>Alejandro Almeida</a:t>
+            </a:r>
+          </a:p>
+          <a:p>
+            <a:endParaRPr lang="es-ES" dirty="0"/>
           </a:p>
         </p:txBody>
       </p:sp>
@@ -43467,12 +43881,27 @@
             <p:ph type="body" sz="quarter" idx="15"/>
           </p:nvPr>
         </p:nvSpPr>
-        <p:spPr/>
+        <p:spPr>
+          <a:xfrm>
+            <a:off x="762987" y="3742393"/>
+            <a:ext cx="4075714" cy="215444"/>
+          </a:xfrm>
+        </p:spPr>
         <p:txBody>
           <a:bodyPr/>
           <a:lstStyle/>
           <a:p>
-            <a:endParaRPr lang="es-ES"/>
+            <a:r>
+              <a:rPr lang="es-ES" b="0" i="0" dirty="0">
+                <a:solidFill>
+                  <a:srgbClr val="676A6C"/>
+                </a:solidFill>
+                <a:effectLst/>
+                <a:latin typeface="open sans" panose="020B0606030504020204" pitchFamily="34" charset="0"/>
+              </a:rPr>
+              <a:t>Microsoft Azure MVP | Azure Lead at Prodware</a:t>
+            </a:r>
+            <a:endParaRPr lang="es-ES" dirty="0"/>
           </a:p>
         </p:txBody>
       </p:sp>
@@ -43492,12 +43921,20 @@
             <p:ph type="body" sz="quarter" idx="16"/>
           </p:nvPr>
         </p:nvSpPr>
-        <p:spPr/>
+        <p:spPr>
+          <a:xfrm>
+            <a:off x="762989" y="4239304"/>
+            <a:ext cx="4075714" cy="246221"/>
+          </a:xfrm>
+        </p:spPr>
         <p:txBody>
           <a:bodyPr/>
           <a:lstStyle/>
           <a:p>
-            <a:endParaRPr lang="es-ES"/>
+            <a:r>
+              <a:rPr lang="es-ES" dirty="0"/>
+              <a:t>Alexander González</a:t>
+            </a:r>
           </a:p>
         </p:txBody>
       </p:sp>
@@ -43517,12 +43954,41 @@
             <p:ph type="body" sz="quarter" idx="17"/>
           </p:nvPr>
         </p:nvSpPr>
-        <p:spPr/>
+        <p:spPr>
+          <a:xfrm>
+            <a:off x="762987" y="4547082"/>
+            <a:ext cx="4075714" cy="215444"/>
+          </a:xfrm>
+        </p:spPr>
         <p:txBody>
           <a:bodyPr/>
           <a:lstStyle/>
           <a:p>
-            <a:endParaRPr lang="es-ES"/>
+            <a:r>
+              <a:rPr lang="es-ES" dirty="0"/>
+              <a:t>Microsoft AI MVP | </a:t>
+            </a:r>
+            <a:r>
+              <a:rPr lang="es-ES" dirty="0" err="1"/>
+              <a:t>Engineer</a:t>
+            </a:r>
+            <a:r>
+              <a:rPr lang="es-ES" dirty="0"/>
+              <a:t> at </a:t>
+            </a:r>
+            <a:r>
+              <a:rPr lang="es-ES" dirty="0" err="1"/>
+              <a:t>Plain</a:t>
+            </a:r>
+            <a:r>
+              <a:rPr lang="es-ES" dirty="0"/>
+              <a:t> </a:t>
+            </a:r>
+            <a:r>
+              <a:rPr lang="es-ES" dirty="0" err="1"/>
+              <a:t>Concepts</a:t>
+            </a:r>
+            <a:endParaRPr lang="es-ES" dirty="0"/>
           </a:p>
         </p:txBody>
       </p:sp>
@@ -45050,6 +45516,15 @@
 </file>
 
 <file path=customXml/item2.xml><?xml version="1.0" encoding="utf-8"?>
+<?mso-contentType ?>
+<FormTemplates xmlns="http://schemas.microsoft.com/sharepoint/v3/contenttype/forms">
+  <Display>DocumentLibraryForm</Display>
+  <Edit>DocumentLibraryForm</Edit>
+  <New>DocumentLibraryForm</New>
+</FormTemplates>
+</file>
+
+<file path=customXml/item3.xml><?xml version="1.0" encoding="utf-8"?>
 <ct:contentTypeSchema xmlns:ct="http://schemas.microsoft.com/office/2006/metadata/contentType" xmlns:ma="http://schemas.microsoft.com/office/2006/metadata/properties/metaAttributes" ct:_="" ma:_="" ma:contentTypeName="PresentationsDoc" ma:contentTypeID="0x010100606EF5350B4AC34299E527B9221D6B5E001A2DF7EB5935C14F830206357EC2322C" ma:contentTypeVersion="34" ma:contentTypeDescription="" ma:contentTypeScope="" ma:versionID="b48d6a27735be7714bdd88c81c28b068">
   <xsd:schema xmlns:xsd="http://www.w3.org/2001/XMLSchema" xmlns:xs="http://www.w3.org/2001/XMLSchema" xmlns:p="http://schemas.microsoft.com/office/2006/metadata/properties" xmlns:ns1="http://schemas.microsoft.com/sharepoint/v3" xmlns:ns2="5a4b3278-325d-441a-b38f-6f1926bc734e" xmlns:ns3="230e9df3-be65-4c73-a93b-d1236ebd677e" xmlns:ns5="9d1f81f6-e953-47ea-988e-33ed651c58e6" targetNamespace="http://schemas.microsoft.com/office/2006/metadata/properties" ma:root="true" ma:fieldsID="61aa76b7b235bae3242d4a7e9080af88" ns1:_="" ns2:_="" ns3:_="" ns5:_="">
     <xsd:import namespace="http://schemas.microsoft.com/sharepoint/v3"/>
@@ -45470,15 +45945,6 @@
 </ct:contentTypeSchema>
 </file>
 
-<file path=customXml/item3.xml><?xml version="1.0" encoding="utf-8"?>
-<?mso-contentType ?>
-<FormTemplates xmlns="http://schemas.microsoft.com/sharepoint/v3/contenttype/forms">
-  <Display>DocumentLibraryForm</Display>
-  <Edit>DocumentLibraryForm</Edit>
-  <New>DocumentLibraryForm</New>
-</FormTemplates>
-</file>
-
 <file path=customXml/itemProps1.xml><?xml version="1.0" encoding="utf-8"?>
 <ds:datastoreItem xmlns:ds="http://schemas.openxmlformats.org/officeDocument/2006/customXml" ds:itemID="{F990F116-B58F-4255-B05B-DA3808E0E5C6}">
   <ds:schemaRefs>
@@ -45501,6 +45967,14 @@
 </file>
 
 <file path=customXml/itemProps2.xml><?xml version="1.0" encoding="utf-8"?>
+<ds:datastoreItem xmlns:ds="http://schemas.openxmlformats.org/officeDocument/2006/customXml" ds:itemID="{758FDAC0-319D-4A54-8D8E-1D42CB1F8004}">
+  <ds:schemaRefs>
+    <ds:schemaRef ds:uri="http://schemas.microsoft.com/sharepoint/v3/contenttype/forms"/>
+  </ds:schemaRefs>
+</ds:datastoreItem>
+</file>
+
+<file path=customXml/itemProps3.xml><?xml version="1.0" encoding="utf-8"?>
 <ds:datastoreItem xmlns:ds="http://schemas.openxmlformats.org/officeDocument/2006/customXml" ds:itemID="{625FD152-D4B9-485B-9213-BB78FF8ABCB4}">
   <ds:schemaRefs>
     <ds:schemaRef ds:uri="http://schemas.microsoft.com/office/2006/metadata/contentType"/>
@@ -45519,12 +45993,4 @@
     <ds:schemaRef ds:uri="http://schemas.microsoft.com/internal/obd"/>
   </ds:schemaRefs>
 </ds:datastoreItem>
-</file>
-
-<file path=customXml/itemProps3.xml><?xml version="1.0" encoding="utf-8"?>
-<ds:datastoreItem xmlns:ds="http://schemas.openxmlformats.org/officeDocument/2006/customXml" ds:itemID="{758FDAC0-319D-4A54-8D8E-1D42CB1F8004}">
-  <ds:schemaRefs>
-    <ds:schemaRef ds:uri="http://schemas.microsoft.com/sharepoint/v3/contenttype/forms"/>
-  </ds:schemaRefs>
-</ds:datastoreItem>
 </file>
</xml_diff>

<commit_message>
ADD Some speakers PPT
</commit_message>
<xml_diff>
--- a/PPT/1. MLOps, configure your continuous training pipelines with Deep Learning models.pptx
+++ b/PPT/1. MLOps, configure your continuous training pipelines with Deep Learning models.pptx
@@ -7,21 +7,20 @@
     <p:sldMasterId id="2147484871" r:id="rId6"/>
   </p:sldMasterIdLst>
   <p:notesMasterIdLst>
-    <p:notesMasterId r:id="rId16"/>
+    <p:notesMasterId r:id="rId15"/>
   </p:notesMasterIdLst>
   <p:handoutMasterIdLst>
-    <p:handoutMasterId r:id="rId17"/>
+    <p:handoutMasterId r:id="rId16"/>
   </p:handoutMasterIdLst>
   <p:sldIdLst>
     <p:sldId id="2076136255" r:id="rId7"/>
-    <p:sldId id="2076136261" r:id="rId8"/>
-    <p:sldId id="2076136263" r:id="rId9"/>
-    <p:sldId id="2076136245" r:id="rId10"/>
-    <p:sldId id="2076136257" r:id="rId11"/>
-    <p:sldId id="2076136258" r:id="rId12"/>
-    <p:sldId id="2076136259" r:id="rId13"/>
-    <p:sldId id="2076136260" r:id="rId14"/>
-    <p:sldId id="2076136262" r:id="rId15"/>
+    <p:sldId id="2076136263" r:id="rId8"/>
+    <p:sldId id="2076136245" r:id="rId9"/>
+    <p:sldId id="2076136257" r:id="rId10"/>
+    <p:sldId id="2076136258" r:id="rId11"/>
+    <p:sldId id="2076136259" r:id="rId12"/>
+    <p:sldId id="2076136260" r:id="rId13"/>
+    <p:sldId id="2076136262" r:id="rId14"/>
   </p:sldIdLst>
   <p:sldSz cx="12192000" cy="6858000"/>
   <p:notesSz cx="6858000" cy="1123950"/>
@@ -130,7 +129,6 @@
         </p14:section>
         <p14:section name="Presentation" id="{111C68EB-42C2-4590-AB8C-55293A14ED12}">
           <p14:sldIdLst>
-            <p14:sldId id="2076136261"/>
             <p14:sldId id="2076136263"/>
             <p14:sldId id="2076136245"/>
           </p14:sldIdLst>
@@ -280,7 +278,7 @@
               <a:rPr lang="en-US" smtClean="0">
                 <a:latin typeface="Segoe UI" pitchFamily="34" charset="0"/>
               </a:rPr>
-              <a:t>1/10/2021 10:19 AM</a:t>
+              <a:t>1/10/2021 2:48 PM</a:t>
             </a:fld>
             <a:endParaRPr lang="en-US">
               <a:latin typeface="Segoe UI" pitchFamily="34" charset="0"/>
@@ -558,7 +556,7 @@
           <a:p>
             <a:fld id="{386CE63F-9E7F-4C04-9D0D-FCA25A8E9E86}" type="datetime8">
               <a:rPr lang="en-US" smtClean="0"/>
-              <a:t>1/10/2021 10:18 AM</a:t>
+              <a:t>1/10/2021 2:48 PM</a:t>
             </a:fld>
             <a:endParaRPr lang="en-US"/>
           </a:p>
@@ -42977,251 +42975,6 @@
         </p:nvSpPr>
         <p:spPr>
           <a:xfrm>
-            <a:off x="584200" y="2921722"/>
-            <a:ext cx="5510213" cy="553998"/>
-          </a:xfrm>
-        </p:spPr>
-        <p:txBody>
-          <a:bodyPr/>
-          <a:lstStyle/>
-          <a:p>
-            <a:r>
-              <a:rPr lang="en-US" dirty="0"/>
-              <a:t>#SorteoCUPON50</a:t>
-            </a:r>
-            <a:endParaRPr lang="es-ES" dirty="0"/>
-          </a:p>
-        </p:txBody>
-      </p:sp>
-      <p:sp>
-        <p:nvSpPr>
-          <p:cNvPr id="7" name="Marcador de texto 6">
-            <a:extLst>
-              <a:ext uri="{FF2B5EF4-FFF2-40B4-BE49-F238E27FC236}">
-                <a16:creationId xmlns:a16="http://schemas.microsoft.com/office/drawing/2014/main" id="{69511D55-34D4-45A0-8602-117128967C6C}"/>
-              </a:ext>
-            </a:extLst>
-          </p:cNvPr>
-          <p:cNvSpPr>
-            <a:spLocks noGrp="1"/>
-          </p:cNvSpPr>
-          <p:nvPr>
-            <p:ph type="body" sz="quarter" idx="12"/>
-          </p:nvPr>
-        </p:nvSpPr>
-        <p:spPr/>
-        <p:txBody>
-          <a:bodyPr/>
-          <a:lstStyle/>
-          <a:p>
-            <a:r>
-              <a:rPr lang="es-ES" dirty="0"/>
-              <a:t>Alejandro Almeida</a:t>
-            </a:r>
-          </a:p>
-        </p:txBody>
-      </p:sp>
-      <p:sp>
-        <p:nvSpPr>
-          <p:cNvPr id="8" name="Marcador de texto 7">
-            <a:extLst>
-              <a:ext uri="{FF2B5EF4-FFF2-40B4-BE49-F238E27FC236}">
-                <a16:creationId xmlns:a16="http://schemas.microsoft.com/office/drawing/2014/main" id="{57BDD8B0-0FB5-474B-A56B-FB1AAA4961CA}"/>
-              </a:ext>
-            </a:extLst>
-          </p:cNvPr>
-          <p:cNvSpPr>
-            <a:spLocks noGrp="1"/>
-          </p:cNvSpPr>
-          <p:nvPr>
-            <p:ph type="body" sz="quarter" idx="13"/>
-          </p:nvPr>
-        </p:nvSpPr>
-        <p:spPr>
-          <a:xfrm>
-            <a:off x="6597944" y="2320226"/>
-            <a:ext cx="4714906" cy="492443"/>
-          </a:xfrm>
-        </p:spPr>
-        <p:txBody>
-          <a:bodyPr/>
-          <a:lstStyle/>
-          <a:p>
-            <a:r>
-              <a:rPr lang="es-ES" dirty="0"/>
-              <a:t>Madrid – </a:t>
-            </a:r>
-            <a:r>
-              <a:rPr lang="es-ES" dirty="0" err="1"/>
-              <a:t>Spain</a:t>
-            </a:r>
-            <a:endParaRPr lang="es-ES" dirty="0"/>
-          </a:p>
-        </p:txBody>
-      </p:sp>
-      <p:sp>
-        <p:nvSpPr>
-          <p:cNvPr id="9" name="Marcador de texto 8">
-            <a:extLst>
-              <a:ext uri="{FF2B5EF4-FFF2-40B4-BE49-F238E27FC236}">
-                <a16:creationId xmlns:a16="http://schemas.microsoft.com/office/drawing/2014/main" id="{45C40D03-0ACA-4055-8A76-253AAF2DB6F5}"/>
-              </a:ext>
-            </a:extLst>
-          </p:cNvPr>
-          <p:cNvSpPr>
-            <a:spLocks noGrp="1"/>
-          </p:cNvSpPr>
-          <p:nvPr>
-            <p:ph type="body" sz="quarter" idx="15"/>
-          </p:nvPr>
-        </p:nvSpPr>
-        <p:spPr/>
-        <p:txBody>
-          <a:bodyPr/>
-          <a:lstStyle/>
-          <a:p>
-            <a:r>
-              <a:rPr lang="es-ES" b="0" i="0" dirty="0">
-                <a:solidFill>
-                  <a:srgbClr val="676A6C"/>
-                </a:solidFill>
-                <a:effectLst/>
-                <a:latin typeface="open sans" panose="020B0606030504020204" pitchFamily="34" charset="0"/>
-              </a:rPr>
-              <a:t>Microsoft Azure MVP | Azure Lead at Prodware</a:t>
-            </a:r>
-            <a:endParaRPr lang="es-ES" dirty="0"/>
-          </a:p>
-        </p:txBody>
-      </p:sp>
-      <p:sp>
-        <p:nvSpPr>
-          <p:cNvPr id="10" name="Marcador de texto 9">
-            <a:extLst>
-              <a:ext uri="{FF2B5EF4-FFF2-40B4-BE49-F238E27FC236}">
-                <a16:creationId xmlns:a16="http://schemas.microsoft.com/office/drawing/2014/main" id="{51F79510-2274-4494-ADE0-993B6B332068}"/>
-              </a:ext>
-            </a:extLst>
-          </p:cNvPr>
-          <p:cNvSpPr>
-            <a:spLocks noGrp="1"/>
-          </p:cNvSpPr>
-          <p:nvPr>
-            <p:ph type="body" sz="quarter" idx="16"/>
-          </p:nvPr>
-        </p:nvSpPr>
-        <p:spPr/>
-        <p:txBody>
-          <a:bodyPr/>
-          <a:lstStyle/>
-          <a:p>
-            <a:r>
-              <a:rPr lang="es-ES" dirty="0"/>
-              <a:t>Alexander González</a:t>
-            </a:r>
-          </a:p>
-        </p:txBody>
-      </p:sp>
-      <p:sp>
-        <p:nvSpPr>
-          <p:cNvPr id="11" name="Marcador de texto 10">
-            <a:extLst>
-              <a:ext uri="{FF2B5EF4-FFF2-40B4-BE49-F238E27FC236}">
-                <a16:creationId xmlns:a16="http://schemas.microsoft.com/office/drawing/2014/main" id="{05FA5317-BE03-448C-B778-A10EC9464330}"/>
-              </a:ext>
-            </a:extLst>
-          </p:cNvPr>
-          <p:cNvSpPr>
-            <a:spLocks noGrp="1"/>
-          </p:cNvSpPr>
-          <p:nvPr>
-            <p:ph type="body" sz="quarter" idx="17"/>
-          </p:nvPr>
-        </p:nvSpPr>
-        <p:spPr/>
-        <p:txBody>
-          <a:bodyPr/>
-          <a:lstStyle/>
-          <a:p>
-            <a:r>
-              <a:rPr lang="es-ES" dirty="0"/>
-              <a:t>Microsoft AI MVP | </a:t>
-            </a:r>
-            <a:r>
-              <a:rPr lang="es-ES" dirty="0" err="1"/>
-              <a:t>Engineer</a:t>
-            </a:r>
-            <a:r>
-              <a:rPr lang="es-ES" dirty="0"/>
-              <a:t> at </a:t>
-            </a:r>
-            <a:r>
-              <a:rPr lang="es-ES" dirty="0" err="1"/>
-              <a:t>Plain</a:t>
-            </a:r>
-            <a:r>
-              <a:rPr lang="es-ES" dirty="0"/>
-              <a:t> </a:t>
-            </a:r>
-            <a:r>
-              <a:rPr lang="es-ES" dirty="0" err="1"/>
-              <a:t>Concepts</a:t>
-            </a:r>
-            <a:endParaRPr lang="es-ES" dirty="0"/>
-          </a:p>
-        </p:txBody>
-      </p:sp>
-    </p:spTree>
-    <p:extLst>
-      <p:ext uri="{BB962C8B-B14F-4D97-AF65-F5344CB8AC3E}">
-        <p14:creationId xmlns:p14="http://schemas.microsoft.com/office/powerpoint/2010/main" val="124482935"/>
-      </p:ext>
-    </p:extLst>
-  </p:cSld>
-  <p:clrMapOvr>
-    <a:masterClrMapping/>
-  </p:clrMapOvr>
-  <p:transition spd="med">
-    <p:pull/>
-  </p:transition>
-</p:sld>
-</file>
-
-<file path=ppt/slides/slide3.xml><?xml version="1.0" encoding="utf-8"?>
-<p:sld xmlns:a="http://schemas.openxmlformats.org/drawingml/2006/main" xmlns:r="http://schemas.openxmlformats.org/officeDocument/2006/relationships" xmlns:p="http://schemas.openxmlformats.org/presentationml/2006/main">
-  <p:cSld>
-    <p:spTree>
-      <p:nvGrpSpPr>
-        <p:cNvPr id="1" name=""/>
-        <p:cNvGrpSpPr/>
-        <p:nvPr/>
-      </p:nvGrpSpPr>
-      <p:grpSpPr>
-        <a:xfrm>
-          <a:off x="0" y="0"/>
-          <a:ext cx="0" cy="0"/>
-          <a:chOff x="0" y="0"/>
-          <a:chExt cx="0" cy="0"/>
-        </a:xfrm>
-      </p:grpSpPr>
-      <p:sp>
-        <p:nvSpPr>
-          <p:cNvPr id="6" name="Título 5">
-            <a:extLst>
-              <a:ext uri="{FF2B5EF4-FFF2-40B4-BE49-F238E27FC236}">
-                <a16:creationId xmlns:a16="http://schemas.microsoft.com/office/drawing/2014/main" id="{155300A5-3509-42AD-8CEF-6590A562B1E5}"/>
-              </a:ext>
-            </a:extLst>
-          </p:cNvPr>
-          <p:cNvSpPr>
-            <a:spLocks noGrp="1"/>
-          </p:cNvSpPr>
-          <p:nvPr>
-            <p:ph type="title"/>
-          </p:nvPr>
-        </p:nvSpPr>
-        <p:spPr>
-          <a:xfrm>
             <a:off x="584200" y="1259729"/>
             <a:ext cx="5510213" cy="2215991"/>
           </a:xfrm>
@@ -43442,7 +43195,7 @@
 </p:sld>
 </file>
 
-<file path=ppt/slides/slide4.xml><?xml version="1.0" encoding="utf-8"?>
+<file path=ppt/slides/slide3.xml><?xml version="1.0" encoding="utf-8"?>
 <p:sld xmlns:a="http://schemas.openxmlformats.org/drawingml/2006/main" xmlns:r="http://schemas.openxmlformats.org/officeDocument/2006/relationships" xmlns:p="http://schemas.openxmlformats.org/presentationml/2006/main">
   <p:cSld>
     <p:spTree>
@@ -43475,7 +43228,7 @@
 </p:sld>
 </file>
 
-<file path=ppt/slides/slide5.xml><?xml version="1.0" encoding="utf-8"?>
+<file path=ppt/slides/slide4.xml><?xml version="1.0" encoding="utf-8"?>
 <p:sld xmlns:a="http://schemas.openxmlformats.org/drawingml/2006/main" xmlns:r="http://schemas.openxmlformats.org/officeDocument/2006/relationships" xmlns:p="http://schemas.openxmlformats.org/presentationml/2006/main">
   <p:cSld>
     <p:spTree>
@@ -43558,7 +43311,7 @@
 </p:sld>
 </file>
 
-<file path=ppt/slides/slide6.xml><?xml version="1.0" encoding="utf-8"?>
+<file path=ppt/slides/slide5.xml><?xml version="1.0" encoding="utf-8"?>
 <p:sld xmlns:a="http://schemas.openxmlformats.org/drawingml/2006/main" xmlns:r="http://schemas.openxmlformats.org/officeDocument/2006/relationships" xmlns:p="http://schemas.openxmlformats.org/presentationml/2006/main">
   <p:cSld>
     <p:spTree>
@@ -43616,7 +43369,7 @@
 </p:sld>
 </file>
 
-<file path=ppt/slides/slide7.xml><?xml version="1.0" encoding="utf-8"?>
+<file path=ppt/slides/slide6.xml><?xml version="1.0" encoding="utf-8"?>
 <p:sld xmlns:a="http://schemas.openxmlformats.org/drawingml/2006/main" xmlns:r="http://schemas.openxmlformats.org/officeDocument/2006/relationships" xmlns:p="http://schemas.openxmlformats.org/presentationml/2006/main">
   <p:cSld>
     <p:spTree>
@@ -43699,7 +43452,7 @@
 </p:sld>
 </file>
 
-<file path=ppt/slides/slide8.xml><?xml version="1.0" encoding="utf-8"?>
+<file path=ppt/slides/slide7.xml><?xml version="1.0" encoding="utf-8"?>
 <p:sld xmlns:a="http://schemas.openxmlformats.org/drawingml/2006/main" xmlns:r="http://schemas.openxmlformats.org/officeDocument/2006/relationships" xmlns:p="http://schemas.openxmlformats.org/presentationml/2006/main">
   <p:cSld>
     <p:spTree>
@@ -43774,7 +43527,7 @@
 </p:sld>
 </file>
 
-<file path=ppt/slides/slide9.xml><?xml version="1.0" encoding="utf-8"?>
+<file path=ppt/slides/slide8.xml><?xml version="1.0" encoding="utf-8"?>
 <p:sld xmlns:a="http://schemas.openxmlformats.org/drawingml/2006/main" xmlns:r="http://schemas.openxmlformats.org/officeDocument/2006/relationships" xmlns:p="http://schemas.openxmlformats.org/presentationml/2006/main">
   <p:cSld>
     <p:spTree>
@@ -45454,77 +45207,6 @@
 </file>
 
 <file path=customXml/item1.xml><?xml version="1.0" encoding="utf-8"?>
-<p:properties xmlns:p="http://schemas.microsoft.com/office/2006/metadata/properties" xmlns:xsi="http://www.w3.org/2001/XMLSchema-instance" xmlns:pc="http://schemas.microsoft.com/office/infopath/2007/PartnerControls">
-  <documentManagement>
-    <_ip_UnifiedCompliancePolicyUIAction xmlns="http://schemas.microsoft.com/sharepoint/v3" xsi:nil="true"/>
-    <_ip_UnifiedCompliancePolicyProperties xmlns="http://schemas.microsoft.com/sharepoint/v3" xsi:nil="true"/>
-    <MediaServiceKeyPoints xmlns="9d1f81f6-e953-47ea-988e-33ed651c58e6" xsi:nil="true"/>
-    <External_x0020_Speaker xmlns="5a4b3278-325d-441a-b38f-6f1926bc734e" xsi:nil="true"/>
-    <j478fa01fff54a9d85f93cc1f742caa8 xmlns="5a4b3278-325d-441a-b38f-6f1926bc734e">
-      <Terms xmlns="http://schemas.microsoft.com/office/infopath/2007/PartnerControls"/>
-    </j478fa01fff54a9d85f93cc1f742caa8>
-    <Event_x0020_End_x0020_Date xmlns="5a4b3278-325d-441a-b38f-6f1926bc734e" xsi:nil="true"/>
-    <LikesCount xmlns="http://schemas.microsoft.com/sharepoint/v3" xsi:nil="true"/>
-    <MS_x0020_Speaker xmlns="5a4b3278-325d-441a-b38f-6f1926bc734e">
-      <UserInfo>
-        <DisplayName/>
-        <AccountId xsi:nil="true"/>
-        <AccountType/>
-      </UserInfo>
-    </MS_x0020_Speaker>
-    <o33121adfc264c7dbcad13be7db3ea4b xmlns="5a4b3278-325d-441a-b38f-6f1926bc734e">
-      <Terms xmlns="http://schemas.microsoft.com/office/infopath/2007/PartnerControls"/>
-    </o33121adfc264c7dbcad13be7db3ea4b>
-    <Session_x0020_Code xmlns="5a4b3278-325d-441a-b38f-6f1926bc734e" xsi:nil="true"/>
-    <Presentation_x0020_Date xmlns="5a4b3278-325d-441a-b38f-6f1926bc734e" xsi:nil="true"/>
-    <ba5aa7e3a41a404e868a451481761228 xmlns="5a4b3278-325d-441a-b38f-6f1926bc734e">
-      <Terms xmlns="http://schemas.microsoft.com/office/infopath/2007/PartnerControls"/>
-    </ba5aa7e3a41a404e868a451481761228>
-    <n26c0b7259a14f82a9880173edc4cb73 xmlns="5a4b3278-325d-441a-b38f-6f1926bc734e">
-      <Terms xmlns="http://schemas.microsoft.com/office/infopath/2007/PartnerControls"/>
-    </n26c0b7259a14f82a9880173edc4cb73>
-    <c4b02e5b2c48420dbed84c0f2f02e9a3 xmlns="5a4b3278-325d-441a-b38f-6f1926bc734e">
-      <Terms xmlns="http://schemas.microsoft.com/office/infopath/2007/PartnerControls"/>
-    </c4b02e5b2c48420dbed84c0f2f02e9a3>
-    <Event_x0020_Start_x0020_Date xmlns="5a4b3278-325d-441a-b38f-6f1926bc734e" xsi:nil="true"/>
-    <MS_x0020_Content_x0020_Owner xmlns="5a4b3278-325d-441a-b38f-6f1926bc734e">
-      <UserInfo>
-        <DisplayName/>
-        <AccountId xsi:nil="true"/>
-        <AccountType/>
-      </UserInfo>
-    </MS_x0020_Content_x0020_Owner>
-    <TaxKeywordTaxHTField xmlns="230e9df3-be65-4c73-a93b-d1236ebd677e">
-      <Terms xmlns="http://schemas.microsoft.com/office/infopath/2007/PartnerControls">
-        <TermInfo xmlns="http://schemas.microsoft.com/office/infopath/2007/PartnerControls">
-          <TermName xmlns="http://schemas.microsoft.com/office/infopath/2007/PartnerControls">Microsoft Ignite The Tour FY20</TermName>
-          <TermId xmlns="http://schemas.microsoft.com/office/infopath/2007/PartnerControls">92cd8354-19e0-47e3-879f-674e86e0d77f</TermId>
-        </TermInfo>
-      </Terms>
-    </TaxKeywordTaxHTField>
-    <j129f3114929433a812312450a84994c xmlns="5a4b3278-325d-441a-b38f-6f1926bc734e">
-      <Terms xmlns="http://schemas.microsoft.com/office/infopath/2007/PartnerControls"/>
-    </j129f3114929433a812312450a84994c>
-    <TaxCatchAll xmlns="230e9df3-be65-4c73-a93b-d1236ebd677e">
-      <Value>251</Value>
-    </TaxCatchAll>
-    <e1750f71052543bd8c4d7217e9f56da0 xmlns="5a4b3278-325d-441a-b38f-6f1926bc734e">
-      <Terms xmlns="http://schemas.microsoft.com/office/infopath/2007/PartnerControls"/>
-    </e1750f71052543bd8c4d7217e9f56da0>
-  </documentManagement>
-</p:properties>
-</file>
-
-<file path=customXml/item2.xml><?xml version="1.0" encoding="utf-8"?>
-<?mso-contentType ?>
-<FormTemplates xmlns="http://schemas.microsoft.com/sharepoint/v3/contenttype/forms">
-  <Display>DocumentLibraryForm</Display>
-  <Edit>DocumentLibraryForm</Edit>
-  <New>DocumentLibraryForm</New>
-</FormTemplates>
-</file>
-
-<file path=customXml/item3.xml><?xml version="1.0" encoding="utf-8"?>
 <ct:contentTypeSchema xmlns:ct="http://schemas.microsoft.com/office/2006/metadata/contentType" xmlns:ma="http://schemas.microsoft.com/office/2006/metadata/properties/metaAttributes" ct:_="" ma:_="" ma:contentTypeName="PresentationsDoc" ma:contentTypeID="0x010100606EF5350B4AC34299E527B9221D6B5E001A2DF7EB5935C14F830206357EC2322C" ma:contentTypeVersion="34" ma:contentTypeDescription="" ma:contentTypeScope="" ma:versionID="b48d6a27735be7714bdd88c81c28b068">
   <xsd:schema xmlns:xsd="http://www.w3.org/2001/XMLSchema" xmlns:xs="http://www.w3.org/2001/XMLSchema" xmlns:p="http://schemas.microsoft.com/office/2006/metadata/properties" xmlns:ns1="http://schemas.microsoft.com/sharepoint/v3" xmlns:ns2="5a4b3278-325d-441a-b38f-6f1926bc734e" xmlns:ns3="230e9df3-be65-4c73-a93b-d1236ebd677e" xmlns:ns5="9d1f81f6-e953-47ea-988e-33ed651c58e6" targetNamespace="http://schemas.microsoft.com/office/2006/metadata/properties" ma:root="true" ma:fieldsID="61aa76b7b235bae3242d4a7e9080af88" ns1:_="" ns2:_="" ns3:_="" ns5:_="">
     <xsd:import namespace="http://schemas.microsoft.com/sharepoint/v3"/>
@@ -45945,7 +45627,107 @@
 </ct:contentTypeSchema>
 </file>
 
+<file path=customXml/item2.xml><?xml version="1.0" encoding="utf-8"?>
+<?mso-contentType ?>
+<FormTemplates xmlns="http://schemas.microsoft.com/sharepoint/v3/contenttype/forms">
+  <Display>DocumentLibraryForm</Display>
+  <Edit>DocumentLibraryForm</Edit>
+  <New>DocumentLibraryForm</New>
+</FormTemplates>
+</file>
+
+<file path=customXml/item3.xml><?xml version="1.0" encoding="utf-8"?>
+<p:properties xmlns:p="http://schemas.microsoft.com/office/2006/metadata/properties" xmlns:xsi="http://www.w3.org/2001/XMLSchema-instance" xmlns:pc="http://schemas.microsoft.com/office/infopath/2007/PartnerControls">
+  <documentManagement>
+    <_ip_UnifiedCompliancePolicyUIAction xmlns="http://schemas.microsoft.com/sharepoint/v3" xsi:nil="true"/>
+    <_ip_UnifiedCompliancePolicyProperties xmlns="http://schemas.microsoft.com/sharepoint/v3" xsi:nil="true"/>
+    <MediaServiceKeyPoints xmlns="9d1f81f6-e953-47ea-988e-33ed651c58e6" xsi:nil="true"/>
+    <External_x0020_Speaker xmlns="5a4b3278-325d-441a-b38f-6f1926bc734e" xsi:nil="true"/>
+    <j478fa01fff54a9d85f93cc1f742caa8 xmlns="5a4b3278-325d-441a-b38f-6f1926bc734e">
+      <Terms xmlns="http://schemas.microsoft.com/office/infopath/2007/PartnerControls"/>
+    </j478fa01fff54a9d85f93cc1f742caa8>
+    <Event_x0020_End_x0020_Date xmlns="5a4b3278-325d-441a-b38f-6f1926bc734e" xsi:nil="true"/>
+    <LikesCount xmlns="http://schemas.microsoft.com/sharepoint/v3" xsi:nil="true"/>
+    <MS_x0020_Speaker xmlns="5a4b3278-325d-441a-b38f-6f1926bc734e">
+      <UserInfo>
+        <DisplayName/>
+        <AccountId xsi:nil="true"/>
+        <AccountType/>
+      </UserInfo>
+    </MS_x0020_Speaker>
+    <o33121adfc264c7dbcad13be7db3ea4b xmlns="5a4b3278-325d-441a-b38f-6f1926bc734e">
+      <Terms xmlns="http://schemas.microsoft.com/office/infopath/2007/PartnerControls"/>
+    </o33121adfc264c7dbcad13be7db3ea4b>
+    <Session_x0020_Code xmlns="5a4b3278-325d-441a-b38f-6f1926bc734e" xsi:nil="true"/>
+    <Presentation_x0020_Date xmlns="5a4b3278-325d-441a-b38f-6f1926bc734e" xsi:nil="true"/>
+    <ba5aa7e3a41a404e868a451481761228 xmlns="5a4b3278-325d-441a-b38f-6f1926bc734e">
+      <Terms xmlns="http://schemas.microsoft.com/office/infopath/2007/PartnerControls"/>
+    </ba5aa7e3a41a404e868a451481761228>
+    <n26c0b7259a14f82a9880173edc4cb73 xmlns="5a4b3278-325d-441a-b38f-6f1926bc734e">
+      <Terms xmlns="http://schemas.microsoft.com/office/infopath/2007/PartnerControls"/>
+    </n26c0b7259a14f82a9880173edc4cb73>
+    <c4b02e5b2c48420dbed84c0f2f02e9a3 xmlns="5a4b3278-325d-441a-b38f-6f1926bc734e">
+      <Terms xmlns="http://schemas.microsoft.com/office/infopath/2007/PartnerControls"/>
+    </c4b02e5b2c48420dbed84c0f2f02e9a3>
+    <Event_x0020_Start_x0020_Date xmlns="5a4b3278-325d-441a-b38f-6f1926bc734e" xsi:nil="true"/>
+    <MS_x0020_Content_x0020_Owner xmlns="5a4b3278-325d-441a-b38f-6f1926bc734e">
+      <UserInfo>
+        <DisplayName/>
+        <AccountId xsi:nil="true"/>
+        <AccountType/>
+      </UserInfo>
+    </MS_x0020_Content_x0020_Owner>
+    <TaxKeywordTaxHTField xmlns="230e9df3-be65-4c73-a93b-d1236ebd677e">
+      <Terms xmlns="http://schemas.microsoft.com/office/infopath/2007/PartnerControls">
+        <TermInfo xmlns="http://schemas.microsoft.com/office/infopath/2007/PartnerControls">
+          <TermName xmlns="http://schemas.microsoft.com/office/infopath/2007/PartnerControls">Microsoft Ignite The Tour FY20</TermName>
+          <TermId xmlns="http://schemas.microsoft.com/office/infopath/2007/PartnerControls">92cd8354-19e0-47e3-879f-674e86e0d77f</TermId>
+        </TermInfo>
+      </Terms>
+    </TaxKeywordTaxHTField>
+    <j129f3114929433a812312450a84994c xmlns="5a4b3278-325d-441a-b38f-6f1926bc734e">
+      <Terms xmlns="http://schemas.microsoft.com/office/infopath/2007/PartnerControls"/>
+    </j129f3114929433a812312450a84994c>
+    <TaxCatchAll xmlns="230e9df3-be65-4c73-a93b-d1236ebd677e">
+      <Value>251</Value>
+    </TaxCatchAll>
+    <e1750f71052543bd8c4d7217e9f56da0 xmlns="5a4b3278-325d-441a-b38f-6f1926bc734e">
+      <Terms xmlns="http://schemas.microsoft.com/office/infopath/2007/PartnerControls"/>
+    </e1750f71052543bd8c4d7217e9f56da0>
+  </documentManagement>
+</p:properties>
+</file>
+
 <file path=customXml/itemProps1.xml><?xml version="1.0" encoding="utf-8"?>
+<ds:datastoreItem xmlns:ds="http://schemas.openxmlformats.org/officeDocument/2006/customXml" ds:itemID="{625FD152-D4B9-485B-9213-BB78FF8ABCB4}">
+  <ds:schemaRefs>
+    <ds:schemaRef ds:uri="http://schemas.microsoft.com/office/2006/metadata/contentType"/>
+    <ds:schemaRef ds:uri="http://schemas.microsoft.com/office/2006/metadata/properties/metaAttributes"/>
+    <ds:schemaRef ds:uri="http://www.w3.org/2001/XMLSchema"/>
+    <ds:schemaRef ds:uri="http://schemas.microsoft.com/office/2006/metadata/properties"/>
+    <ds:schemaRef ds:uri="http://schemas.microsoft.com/sharepoint/v3"/>
+    <ds:schemaRef ds:uri="5a4b3278-325d-441a-b38f-6f1926bc734e"/>
+    <ds:schemaRef ds:uri="230e9df3-be65-4c73-a93b-d1236ebd677e"/>
+    <ds:schemaRef ds:uri="9d1f81f6-e953-47ea-988e-33ed651c58e6"/>
+    <ds:schemaRef ds:uri="http://schemas.microsoft.com/office/2006/documentManagement/types"/>
+    <ds:schemaRef ds:uri="http://schemas.microsoft.com/office/infopath/2007/PartnerControls"/>
+    <ds:schemaRef ds:uri="http://schemas.openxmlformats.org/package/2006/metadata/core-properties"/>
+    <ds:schemaRef ds:uri="http://purl.org/dc/elements/1.1/"/>
+    <ds:schemaRef ds:uri="http://purl.org/dc/terms/"/>
+    <ds:schemaRef ds:uri="http://schemas.microsoft.com/internal/obd"/>
+  </ds:schemaRefs>
+</ds:datastoreItem>
+</file>
+
+<file path=customXml/itemProps2.xml><?xml version="1.0" encoding="utf-8"?>
+<ds:datastoreItem xmlns:ds="http://schemas.openxmlformats.org/officeDocument/2006/customXml" ds:itemID="{758FDAC0-319D-4A54-8D8E-1D42CB1F8004}">
+  <ds:schemaRefs>
+    <ds:schemaRef ds:uri="http://schemas.microsoft.com/sharepoint/v3/contenttype/forms"/>
+  </ds:schemaRefs>
+</ds:datastoreItem>
+</file>
+
+<file path=customXml/itemProps3.xml><?xml version="1.0" encoding="utf-8"?>
 <ds:datastoreItem xmlns:ds="http://schemas.openxmlformats.org/officeDocument/2006/customXml" ds:itemID="{F990F116-B58F-4255-B05B-DA3808E0E5C6}">
   <ds:schemaRefs>
     <ds:schemaRef ds:uri="12239fb0-26c0-4a37-b790-6c81fba9d0fc"/>
@@ -45964,33 +45746,4 @@
     <ds:schemaRef ds:uri="230e9df3-be65-4c73-a93b-d1236ebd677e"/>
   </ds:schemaRefs>
 </ds:datastoreItem>
-</file>
-
-<file path=customXml/itemProps2.xml><?xml version="1.0" encoding="utf-8"?>
-<ds:datastoreItem xmlns:ds="http://schemas.openxmlformats.org/officeDocument/2006/customXml" ds:itemID="{758FDAC0-319D-4A54-8D8E-1D42CB1F8004}">
-  <ds:schemaRefs>
-    <ds:schemaRef ds:uri="http://schemas.microsoft.com/sharepoint/v3/contenttype/forms"/>
-  </ds:schemaRefs>
-</ds:datastoreItem>
-</file>
-
-<file path=customXml/itemProps3.xml><?xml version="1.0" encoding="utf-8"?>
-<ds:datastoreItem xmlns:ds="http://schemas.openxmlformats.org/officeDocument/2006/customXml" ds:itemID="{625FD152-D4B9-485B-9213-BB78FF8ABCB4}">
-  <ds:schemaRefs>
-    <ds:schemaRef ds:uri="http://schemas.microsoft.com/office/2006/metadata/contentType"/>
-    <ds:schemaRef ds:uri="http://schemas.microsoft.com/office/2006/metadata/properties/metaAttributes"/>
-    <ds:schemaRef ds:uri="http://www.w3.org/2001/XMLSchema"/>
-    <ds:schemaRef ds:uri="http://schemas.microsoft.com/office/2006/metadata/properties"/>
-    <ds:schemaRef ds:uri="http://schemas.microsoft.com/sharepoint/v3"/>
-    <ds:schemaRef ds:uri="5a4b3278-325d-441a-b38f-6f1926bc734e"/>
-    <ds:schemaRef ds:uri="230e9df3-be65-4c73-a93b-d1236ebd677e"/>
-    <ds:schemaRef ds:uri="9d1f81f6-e953-47ea-988e-33ed651c58e6"/>
-    <ds:schemaRef ds:uri="http://schemas.microsoft.com/office/2006/documentManagement/types"/>
-    <ds:schemaRef ds:uri="http://schemas.microsoft.com/office/infopath/2007/PartnerControls"/>
-    <ds:schemaRef ds:uri="http://schemas.openxmlformats.org/package/2006/metadata/core-properties"/>
-    <ds:schemaRef ds:uri="http://purl.org/dc/elements/1.1/"/>
-    <ds:schemaRef ds:uri="http://purl.org/dc/terms/"/>
-    <ds:schemaRef ds:uri="http://schemas.microsoft.com/internal/obd"/>
-  </ds:schemaRefs>
-</ds:datastoreItem>
 </file>
</xml_diff>

<commit_message>
ADD Agenda and some changes on ppt
</commit_message>
<xml_diff>
--- a/PPT/1. MLOps, configure your continuous training pipelines with Deep Learning models.pptx
+++ b/PPT/1. MLOps, configure your continuous training pipelines with Deep Learning models.pptx
@@ -278,7 +278,7 @@
               <a:rPr lang="en-US" smtClean="0">
                 <a:latin typeface="Segoe UI" pitchFamily="34" charset="0"/>
               </a:rPr>
-              <a:t>1/11/2021 10:06 AM</a:t>
+              <a:t>1/11/2021 2:38 PM</a:t>
             </a:fld>
             <a:endParaRPr lang="en-US">
               <a:latin typeface="Segoe UI" pitchFamily="34" charset="0"/>
@@ -556,7 +556,7 @@
           <a:p>
             <a:fld id="{386CE63F-9E7F-4C04-9D0D-FCA25A8E9E86}" type="datetime8">
               <a:rPr lang="en-US" smtClean="0"/>
-              <a:t>1/11/2021 10:06 AM</a:t>
+              <a:t>1/11/2021 11:27 AM</a:t>
             </a:fld>
             <a:endParaRPr lang="en-US"/>
           </a:p>
@@ -43606,10 +43606,10 @@
       </p:grpSpPr>
       <p:sp>
         <p:nvSpPr>
-          <p:cNvPr id="2" name="Título 1">
+          <p:cNvPr id="6" name="Título 5">
             <a:extLst>
               <a:ext uri="{FF2B5EF4-FFF2-40B4-BE49-F238E27FC236}">
-                <a16:creationId xmlns:a16="http://schemas.microsoft.com/office/drawing/2014/main" id="{0626A76E-B9E1-43DE-894F-7F636E821576}"/>
+                <a16:creationId xmlns:a16="http://schemas.microsoft.com/office/drawing/2014/main" id="{51EB3C52-0FBE-4DE1-80C4-CAC4F5FC254C}"/>
               </a:ext>
             </a:extLst>
           </p:cNvPr>
@@ -43620,34 +43620,21 @@
             <p:ph type="title"/>
           </p:nvPr>
         </p:nvSpPr>
-        <p:spPr>
-          <a:xfrm>
-            <a:off x="762991" y="1295467"/>
-            <a:ext cx="4075714" cy="1723549"/>
-          </a:xfrm>
-        </p:spPr>
+        <p:spPr/>
         <p:txBody>
           <a:bodyPr/>
           <a:lstStyle/>
           <a:p>
-            <a:r>
-              <a:rPr lang="en-US" dirty="0" err="1"/>
-              <a:t>MLOps</a:t>
-            </a:r>
-            <a:r>
-              <a:rPr lang="en-US" dirty="0"/>
-              <a:t>, configure your continuous training pipelines with Deep Learning models</a:t>
-            </a:r>
-            <a:endParaRPr lang="es-ES" dirty="0"/>
+            <a:endParaRPr lang="es-ES"/>
           </a:p>
         </p:txBody>
       </p:sp>
       <p:sp>
         <p:nvSpPr>
-          <p:cNvPr id="3" name="Marcador de texto 2">
+          <p:cNvPr id="10" name="Marcador de texto 9">
             <a:extLst>
               <a:ext uri="{FF2B5EF4-FFF2-40B4-BE49-F238E27FC236}">
-                <a16:creationId xmlns:a16="http://schemas.microsoft.com/office/drawing/2014/main" id="{CE7F95F9-74E0-445F-A3BF-CDBCBC1B21DE}"/>
+                <a16:creationId xmlns:a16="http://schemas.microsoft.com/office/drawing/2014/main" id="{08240BEB-143C-4338-81E4-1C31AAEA777C}"/>
               </a:ext>
             </a:extLst>
           </p:cNvPr>
@@ -43658,32 +43645,21 @@
             <p:ph type="body" sz="quarter" idx="12"/>
           </p:nvPr>
         </p:nvSpPr>
-        <p:spPr>
-          <a:xfrm>
-            <a:off x="762991" y="3418734"/>
-            <a:ext cx="4075714" cy="492443"/>
-          </a:xfrm>
-        </p:spPr>
+        <p:spPr/>
         <p:txBody>
           <a:bodyPr/>
           <a:lstStyle/>
           <a:p>
-            <a:r>
-              <a:rPr lang="es-ES" dirty="0"/>
-              <a:t>Alejandro Almeida</a:t>
-            </a:r>
-          </a:p>
-          <a:p>
-            <a:endParaRPr lang="es-ES" dirty="0"/>
+            <a:endParaRPr lang="es-ES"/>
           </a:p>
         </p:txBody>
       </p:sp>
       <p:sp>
         <p:nvSpPr>
-          <p:cNvPr id="5" name="Marcador de texto 4">
+          <p:cNvPr id="12" name="Marcador de texto 11">
             <a:extLst>
               <a:ext uri="{FF2B5EF4-FFF2-40B4-BE49-F238E27FC236}">
-                <a16:creationId xmlns:a16="http://schemas.microsoft.com/office/drawing/2014/main" id="{087C93F1-B345-43F6-88F9-A852BDE767E4}"/>
+                <a16:creationId xmlns:a16="http://schemas.microsoft.com/office/drawing/2014/main" id="{30952AE8-45B7-4C75-B731-200AC9466155}"/>
               </a:ext>
             </a:extLst>
           </p:cNvPr>
@@ -43694,36 +43670,21 @@
             <p:ph type="body" sz="quarter" idx="15"/>
           </p:nvPr>
         </p:nvSpPr>
-        <p:spPr>
-          <a:xfrm>
-            <a:off x="762987" y="3742393"/>
-            <a:ext cx="4075714" cy="215444"/>
-          </a:xfrm>
-        </p:spPr>
+        <p:spPr/>
         <p:txBody>
           <a:bodyPr/>
           <a:lstStyle/>
           <a:p>
-            <a:r>
-              <a:rPr lang="es-ES" b="0" i="0" dirty="0">
-                <a:solidFill>
-                  <a:srgbClr val="676A6C"/>
-                </a:solidFill>
-                <a:effectLst/>
-                <a:latin typeface="open sans" panose="020B0606030504020204" pitchFamily="34" charset="0"/>
-              </a:rPr>
-              <a:t>Microsoft Azure MVP | Azure Lead at Prodware</a:t>
-            </a:r>
-            <a:endParaRPr lang="es-ES" dirty="0"/>
+            <a:endParaRPr lang="es-ES"/>
           </a:p>
         </p:txBody>
       </p:sp>
       <p:sp>
         <p:nvSpPr>
-          <p:cNvPr id="7" name="Marcador de texto 6">
+          <p:cNvPr id="14" name="Marcador de texto 13">
             <a:extLst>
               <a:ext uri="{FF2B5EF4-FFF2-40B4-BE49-F238E27FC236}">
-                <a16:creationId xmlns:a16="http://schemas.microsoft.com/office/drawing/2014/main" id="{8EF35D44-2C5B-40E9-B454-F56774A87418}"/>
+                <a16:creationId xmlns:a16="http://schemas.microsoft.com/office/drawing/2014/main" id="{14FFF092-B7F8-47FB-B228-EFE56E122F4E}"/>
               </a:ext>
             </a:extLst>
           </p:cNvPr>
@@ -43734,29 +43695,21 @@
             <p:ph type="body" sz="quarter" idx="16"/>
           </p:nvPr>
         </p:nvSpPr>
-        <p:spPr>
-          <a:xfrm>
-            <a:off x="762989" y="4239304"/>
-            <a:ext cx="4075714" cy="246221"/>
-          </a:xfrm>
-        </p:spPr>
+        <p:spPr/>
         <p:txBody>
           <a:bodyPr/>
           <a:lstStyle/>
           <a:p>
-            <a:r>
-              <a:rPr lang="es-ES" dirty="0"/>
-              <a:t>Alexander González</a:t>
-            </a:r>
+            <a:endParaRPr lang="es-ES"/>
           </a:p>
         </p:txBody>
       </p:sp>
       <p:sp>
         <p:nvSpPr>
-          <p:cNvPr id="8" name="Marcador de texto 7">
+          <p:cNvPr id="16" name="Marcador de texto 15">
             <a:extLst>
               <a:ext uri="{FF2B5EF4-FFF2-40B4-BE49-F238E27FC236}">
-                <a16:creationId xmlns:a16="http://schemas.microsoft.com/office/drawing/2014/main" id="{B5A653BA-DCA7-4396-B752-FF12285E0B37}"/>
+                <a16:creationId xmlns:a16="http://schemas.microsoft.com/office/drawing/2014/main" id="{928C683B-17F0-4CC4-AE3A-5109D95A1B9F}"/>
               </a:ext>
             </a:extLst>
           </p:cNvPr>
@@ -43767,41 +43720,12 @@
             <p:ph type="body" sz="quarter" idx="17"/>
           </p:nvPr>
         </p:nvSpPr>
-        <p:spPr>
-          <a:xfrm>
-            <a:off x="762987" y="4547082"/>
-            <a:ext cx="4075714" cy="215444"/>
-          </a:xfrm>
-        </p:spPr>
+        <p:spPr/>
         <p:txBody>
           <a:bodyPr/>
           <a:lstStyle/>
           <a:p>
-            <a:r>
-              <a:rPr lang="es-ES" dirty="0"/>
-              <a:t>Microsoft AI MVP | </a:t>
-            </a:r>
-            <a:r>
-              <a:rPr lang="es-ES" dirty="0" err="1"/>
-              <a:t>Engineer</a:t>
-            </a:r>
-            <a:r>
-              <a:rPr lang="es-ES" dirty="0"/>
-              <a:t> at </a:t>
-            </a:r>
-            <a:r>
-              <a:rPr lang="es-ES" dirty="0" err="1"/>
-              <a:t>Plain</a:t>
-            </a:r>
-            <a:r>
-              <a:rPr lang="es-ES" dirty="0"/>
-              <a:t> </a:t>
-            </a:r>
-            <a:r>
-              <a:rPr lang="es-ES" dirty="0" err="1"/>
-              <a:t>Concepts</a:t>
-            </a:r>
-            <a:endParaRPr lang="es-ES" dirty="0"/>
+            <a:endParaRPr lang="es-ES"/>
           </a:p>
         </p:txBody>
       </p:sp>
@@ -45688,15 +45612,6 @@
 </file>
 
 <file path=customXml/item2.xml><?xml version="1.0" encoding="utf-8"?>
-<?mso-contentType ?>
-<FormTemplates xmlns="http://schemas.microsoft.com/sharepoint/v3/contenttype/forms">
-  <Display>DocumentLibraryForm</Display>
-  <Edit>DocumentLibraryForm</Edit>
-  <New>DocumentLibraryForm</New>
-</FormTemplates>
-</file>
-
-<file path=customXml/item3.xml><?xml version="1.0" encoding="utf-8"?>
 <p:properties xmlns:p="http://schemas.microsoft.com/office/2006/metadata/properties" xmlns:xsi="http://www.w3.org/2001/XMLSchema-instance" xmlns:pc="http://schemas.microsoft.com/office/infopath/2007/PartnerControls">
   <documentManagement>
     <_ip_UnifiedCompliancePolicyUIAction xmlns="http://schemas.microsoft.com/sharepoint/v3" xsi:nil="true"/>
@@ -45758,6 +45673,15 @@
 </p:properties>
 </file>
 
+<file path=customXml/item3.xml><?xml version="1.0" encoding="utf-8"?>
+<?mso-contentType ?>
+<FormTemplates xmlns="http://schemas.microsoft.com/sharepoint/v3/contenttype/forms">
+  <Display>DocumentLibraryForm</Display>
+  <Edit>DocumentLibraryForm</Edit>
+  <New>DocumentLibraryForm</New>
+</FormTemplates>
+</file>
+
 <file path=customXml/itemProps1.xml><?xml version="1.0" encoding="utf-8"?>
 <ds:datastoreItem xmlns:ds="http://schemas.openxmlformats.org/officeDocument/2006/customXml" ds:itemID="{625FD152-D4B9-485B-9213-BB78FF8ABCB4}">
   <ds:schemaRefs>
@@ -45780,14 +45704,6 @@
 </file>
 
 <file path=customXml/itemProps2.xml><?xml version="1.0" encoding="utf-8"?>
-<ds:datastoreItem xmlns:ds="http://schemas.openxmlformats.org/officeDocument/2006/customXml" ds:itemID="{758FDAC0-319D-4A54-8D8E-1D42CB1F8004}">
-  <ds:schemaRefs>
-    <ds:schemaRef ds:uri="http://schemas.microsoft.com/sharepoint/v3/contenttype/forms"/>
-  </ds:schemaRefs>
-</ds:datastoreItem>
-</file>
-
-<file path=customXml/itemProps3.xml><?xml version="1.0" encoding="utf-8"?>
 <ds:datastoreItem xmlns:ds="http://schemas.openxmlformats.org/officeDocument/2006/customXml" ds:itemID="{F990F116-B58F-4255-B05B-DA3808E0E5C6}">
   <ds:schemaRefs>
     <ds:schemaRef ds:uri="12239fb0-26c0-4a37-b790-6c81fba9d0fc"/>
@@ -45806,4 +45722,12 @@
     <ds:schemaRef ds:uri="230e9df3-be65-4c73-a93b-d1236ebd677e"/>
   </ds:schemaRefs>
 </ds:datastoreItem>
+</file>
+
+<file path=customXml/itemProps3.xml><?xml version="1.0" encoding="utf-8"?>
+<ds:datastoreItem xmlns:ds="http://schemas.openxmlformats.org/officeDocument/2006/customXml" ds:itemID="{758FDAC0-319D-4A54-8D8E-1D42CB1F8004}">
+  <ds:schemaRefs>
+    <ds:schemaRef ds:uri="http://schemas.microsoft.com/sharepoint/v3/contenttype/forms"/>
+  </ds:schemaRefs>
+</ds:datastoreItem>
 </file>
</xml_diff>